<commit_message>
🚧  Update poster file
</commit_message>
<xml_diff>
--- a/Documents/Temporary_Documents/پوستر-کارآموزی.pptx
+++ b/Documents/Temporary_Documents/پوستر-کارآموزی.pptx
@@ -2254,7 +2254,7 @@
         </p:nvGrpSpPr>
         <p:grpSpPr>
           <a:xfrm>
-            <a:off x="428151" y="3337840"/>
+            <a:off x="428151" y="3036293"/>
             <a:ext cx="20565596" cy="26633102"/>
             <a:chOff x="428151" y="3337840"/>
             <a:chExt cx="20565596" cy="26633102"/>
@@ -2527,7 +2527,37 @@
               <a:rPr lang="fa-IR" sz="3600" dirty="0" smtClean="0">
                 <a:cs typeface="B Nazanin" panose="00000400000000000000" pitchFamily="2" charset="-78"/>
               </a:rPr>
-              <a:t> محاسبات تقریبی، موضوع جدید و مورد بحثی در طراحی دیجیتال می‌باشد که هدف از بررسی و تحقیق در این زمینه، بهبود سرعت، مساحت و توان مصرفی طرح های دیجیتال مورد استفاده در واحد های پردازشگر می‌باشد. با جایگزینی واحد های محاسباتی تقریبی با میزان خطای منطقی و قابل قبول، به جای واحد های محاسباتی دقیق ما به مزایای دیگری مانند سرعت و یا توان مصرفی کمتر دست پیدا می‌کنیم. بعد از مطالعه مقالات متعدد و تحقیقات در رابطه با عملیات های ریاضی تقریبی که این روزه در پردازنده ها و واحد های پردازشگر هوش مصنوعی و پردازش تصویر استفاده می‌شود، ما اقدام به بهبود یکی از طرح های ارائه شده در مقاله ای بین المللی کردیم و حاصل آن طراحی ضرب کننده جدیدی شد که میزان خطای آن توسط کاربر قابل کنترل می‌باشد.</a:t>
+              <a:t>محاسبات </a:t>
+            </a:r>
+            <a:r>
+              <a:rPr lang="fa-IR" sz="3600" dirty="0" smtClean="0">
+                <a:cs typeface="B Nazanin" panose="00000400000000000000" pitchFamily="2" charset="-78"/>
+              </a:rPr>
+              <a:t>تقریبی، موضوع جدید و مورد بحثی در طراحی دیجیتال می‌باشد که هدف از بررسی و تحقیق در این زمینه، بهبود سرعت، مساحت و توان مصرفی طرح های دیجیتال مورد استفاده در واحد های پردازشگر می‌باشد. با جایگزینی واحد های محاسباتی تقریبی با میزان خطای منطقی و قابل قبول، به جای واحد های محاسباتی دقیق ما به </a:t>
+            </a:r>
+            <a:r>
+              <a:rPr lang="fa-IR" sz="3600" dirty="0" smtClean="0">
+                <a:cs typeface="B Nazanin" panose="00000400000000000000" pitchFamily="2" charset="-78"/>
+              </a:rPr>
+              <a:t>مزایایی مانند </a:t>
+            </a:r>
+            <a:r>
+              <a:rPr lang="fa-IR" sz="3600" dirty="0" smtClean="0">
+                <a:cs typeface="B Nazanin" panose="00000400000000000000" pitchFamily="2" charset="-78"/>
+              </a:rPr>
+              <a:t>سرعت </a:t>
+            </a:r>
+            <a:r>
+              <a:rPr lang="fa-IR" sz="3600" dirty="0" smtClean="0">
+                <a:cs typeface="B Nazanin" panose="00000400000000000000" pitchFamily="2" charset="-78"/>
+              </a:rPr>
+              <a:t>بیشتر و </a:t>
+            </a:r>
+            <a:r>
+              <a:rPr lang="fa-IR" sz="3600" dirty="0" smtClean="0">
+                <a:cs typeface="B Nazanin" panose="00000400000000000000" pitchFamily="2" charset="-78"/>
+              </a:rPr>
+              <a:t>یا توان مصرفی کمتر دست پیدا می‌کنیم. بعد از مطالعه مقالات متعدد و تحقیقات در رابطه با عملیات های ریاضی تقریبی که این روزه در پردازنده ها و واحد های پردازشگر هوش مصنوعی و پردازش تصویر استفاده می‌شود، ما اقدام به بهبود یکی از طرح های ارائه شده در مقاله ای بین المللی کردیم و حاصل آن طراحی ضرب کننده جدیدی شد که میزان خطای آن توسط کاربر قابل کنترل می‌باشد.</a:t>
             </a:r>
           </a:p>
           <a:p>
@@ -2542,7 +2572,25 @@
               <a:rPr lang="fa-IR" sz="3600" dirty="0" smtClean="0">
                 <a:cs typeface="B Nazanin" panose="00000400000000000000" pitchFamily="2" charset="-78"/>
               </a:rPr>
-              <a:t> بعد از طراحی ضرب کننده، ما اقدام به طراحی یک پروسسور 32 بیتی با معماری </a:t>
+              <a:t>بعد </a:t>
+            </a:r>
+            <a:r>
+              <a:rPr lang="fa-IR" sz="3600" dirty="0" smtClean="0">
+                <a:cs typeface="B Nazanin" panose="00000400000000000000" pitchFamily="2" charset="-78"/>
+              </a:rPr>
+              <a:t>از طراحی ضرب کننده</a:t>
+            </a:r>
+            <a:r>
+              <a:rPr lang="fa-IR" sz="3600" dirty="0" smtClean="0">
+                <a:cs typeface="B Nazanin" panose="00000400000000000000" pitchFamily="2" charset="-78"/>
+              </a:rPr>
+              <a:t>، </a:t>
+            </a:r>
+            <a:r>
+              <a:rPr lang="fa-IR" sz="3600" dirty="0" smtClean="0">
+                <a:cs typeface="B Nazanin" panose="00000400000000000000" pitchFamily="2" charset="-78"/>
+              </a:rPr>
+              <a:t>طراحی یک پروسسور 32 بیتی با معماری </a:t>
             </a:r>
             <a:r>
               <a:rPr lang="en-US" sz="3600" dirty="0" smtClean="0">
@@ -2554,26 +2602,47 @@
               <a:rPr lang="fa-IR" sz="3600" dirty="0" smtClean="0">
                 <a:cs typeface="B Nazanin" panose="00000400000000000000" pitchFamily="2" charset="-78"/>
               </a:rPr>
-              <a:t> کردیم که از مزیای طراحی ماژولار، پایپلاین 5 مرحله ای و واحد کنترل غیر متمرکز بهره می‌برد که باعث دسترسی به فرکانس 250 مگاهرتزی در پردازنده شد که عدد </a:t>
-            </a:r>
-            <a:r>
-              <a:rPr lang="fa-IR" sz="3600" smtClean="0">
-                <a:cs typeface="B Nazanin" panose="00000400000000000000" pitchFamily="2" charset="-78"/>
-              </a:rPr>
-              <a:t>قابل </a:t>
-            </a:r>
-            <a:r>
-              <a:rPr lang="fa-IR" sz="3600" smtClean="0">
-                <a:cs typeface="B Nazanin" panose="00000400000000000000" pitchFamily="2" charset="-78"/>
-              </a:rPr>
-              <a:t>قبول </a:t>
-            </a:r>
-            <a:r>
-              <a:rPr lang="fa-IR" sz="3600" dirty="0" smtClean="0">
-                <a:cs typeface="B Nazanin" panose="00000400000000000000" pitchFamily="2" charset="-78"/>
-              </a:rPr>
-              <a:t>و مناسبی برای پروسسور های مصرفی در پروژه های میکروکنترلری و سیستم های نهفته می‌باشد. در نهایت ضرب کننده تقریبی در معماری پردازنده طراحی شده، قرار گرفته شد و مورد استفاده قرار گرفت.</a:t>
-            </a:r>
+              <a:t> </a:t>
+            </a:r>
+            <a:r>
+              <a:rPr lang="fa-IR" sz="3600" dirty="0" smtClean="0">
+                <a:cs typeface="B Nazanin" panose="00000400000000000000" pitchFamily="2" charset="-78"/>
+              </a:rPr>
+              <a:t>آغاز گردید</a:t>
+            </a:r>
+            <a:r>
+              <a:rPr lang="fa-IR" sz="3600" dirty="0" smtClean="0">
+                <a:cs typeface="B Nazanin" panose="00000400000000000000" pitchFamily="2" charset="-78"/>
+              </a:rPr>
+              <a:t> </a:t>
+            </a:r>
+            <a:r>
+              <a:rPr lang="fa-IR" sz="3600" dirty="0" smtClean="0">
+                <a:cs typeface="B Nazanin" panose="00000400000000000000" pitchFamily="2" charset="-78"/>
+              </a:rPr>
+              <a:t>که از مزیای طراحی ماژولار، پایپلاین 5 مرحله ای و واحد کنترل غیر متمرکز </a:t>
+            </a:r>
+            <a:r>
+              <a:rPr lang="fa-IR" sz="3600" dirty="0" smtClean="0">
+                <a:cs typeface="B Nazanin" panose="00000400000000000000" pitchFamily="2" charset="-78"/>
+              </a:rPr>
+              <a:t>بهره‌ مند می‌باشد. پردازنده طراحی شده با تکنولوژی 0.18 میکرون </a:t>
+            </a:r>
+            <a:r>
+              <a:rPr lang="en-US" sz="3600" dirty="0" smtClean="0">
+                <a:cs typeface="B Nazanin" panose="00000400000000000000" pitchFamily="2" charset="-78"/>
+              </a:rPr>
+              <a:t>TSMC</a:t>
+            </a:r>
+            <a:r>
+              <a:rPr lang="fa-IR" sz="3600" dirty="0" smtClean="0">
+                <a:cs typeface="B Nazanin" panose="00000400000000000000" pitchFamily="2" charset="-78"/>
+              </a:rPr>
+              <a:t> فرکانس کاری 250 مگاهرتز را دارا می‌باشد، که در مقایسه با پردازنده های میکروکنترلری و سیستم های نهفته هم ردیف خود عدد بسیار خوبی است.</a:t>
+            </a:r>
+            <a:endParaRPr lang="fa-IR" sz="3600" dirty="0" smtClean="0">
+              <a:cs typeface="B Nazanin" panose="00000400000000000000" pitchFamily="2" charset="-78"/>
+            </a:endParaRPr>
           </a:p>
           <a:p>
             <a:pPr marL="228609" indent="-228609" algn="just" rtl="1">
@@ -2912,16 +2981,16 @@
               <a:buChar char="•"/>
             </a:pPr>
             <a:r>
-              <a:rPr lang="en-US" sz="3600" dirty="0" smtClean="0">
-                <a:cs typeface="B Nazanin" panose="00000400000000000000" pitchFamily="2" charset="-78"/>
-              </a:rPr>
-              <a:t> </a:t>
-            </a:r>
-            <a:r>
-              <a:rPr lang="fa-IR" sz="3600" dirty="0" smtClean="0">
-                <a:cs typeface="B Nazanin" panose="00000400000000000000" pitchFamily="2" charset="-78"/>
-              </a:rPr>
-              <a:t>طراحی مدار ضرب کننده تقریبی با خطای قابل کنترل</a:t>
+              <a:rPr lang="fa-IR" sz="3600" dirty="0" smtClean="0">
+                <a:cs typeface="B Nazanin" panose="00000400000000000000" pitchFamily="2" charset="-78"/>
+              </a:rPr>
+              <a:t>طراحی </a:t>
+            </a:r>
+            <a:r>
+              <a:rPr lang="fa-IR" sz="3600" dirty="0" smtClean="0">
+                <a:cs typeface="B Nazanin" panose="00000400000000000000" pitchFamily="2" charset="-78"/>
+              </a:rPr>
+              <a:t>مدار ضرب کننده تقریبی با خطای قابل کنترل</a:t>
             </a:r>
             <a:endParaRPr lang="fa-IR" sz="3600" dirty="0">
               <a:cs typeface="B Nazanin" panose="00000400000000000000" pitchFamily="2" charset="-78"/>
@@ -2939,7 +3008,13 @@
               <a:rPr lang="fa-IR" sz="3600" dirty="0" smtClean="0">
                 <a:cs typeface="B Nazanin" panose="00000400000000000000" pitchFamily="2" charset="-78"/>
               </a:rPr>
-              <a:t> بررسی ضرب کننده در الگوریتم پردازش تصویر و مقایسه نتیج با مقالات معتبر</a:t>
+              <a:t>بررسی </a:t>
+            </a:r>
+            <a:r>
+              <a:rPr lang="fa-IR" sz="3600" dirty="0" smtClean="0">
+                <a:cs typeface="B Nazanin" panose="00000400000000000000" pitchFamily="2" charset="-78"/>
+              </a:rPr>
+              <a:t>ضرب کننده در الگوریتم پردازش تصویر و مقایسه نتیج با مقالات معتبر</a:t>
             </a:r>
           </a:p>
           <a:p>
@@ -2951,16 +3026,16 @@
               <a:buChar char="•"/>
             </a:pPr>
             <a:r>
-              <a:rPr lang="fa-IR" sz="3600" dirty="0">
-                <a:cs typeface="B Nazanin" panose="00000400000000000000" pitchFamily="2" charset="-78"/>
-              </a:rPr>
-              <a:t> </a:t>
-            </a:r>
-            <a:r>
-              <a:rPr lang="fa-IR" sz="3600" dirty="0" smtClean="0">
-                <a:cs typeface="B Nazanin" panose="00000400000000000000" pitchFamily="2" charset="-78"/>
-              </a:rPr>
-              <a:t>طراحی و رسم بلوک دیاگرام پردازنده</a:t>
+              <a:rPr lang="fa-IR" sz="3600" dirty="0" smtClean="0">
+                <a:cs typeface="B Nazanin" panose="00000400000000000000" pitchFamily="2" charset="-78"/>
+              </a:rPr>
+              <a:t>طراحی </a:t>
+            </a:r>
+            <a:r>
+              <a:rPr lang="fa-IR" sz="3600" dirty="0" smtClean="0">
+                <a:cs typeface="B Nazanin" panose="00000400000000000000" pitchFamily="2" charset="-78"/>
+              </a:rPr>
+              <a:t>و رسم بلوک دیاگرام پردازنده</a:t>
             </a:r>
           </a:p>
           <a:p>
@@ -2972,16 +3047,16 @@
               <a:buChar char="•"/>
             </a:pPr>
             <a:r>
-              <a:rPr lang="fa-IR" sz="3600" dirty="0">
-                <a:cs typeface="B Nazanin" panose="00000400000000000000" pitchFamily="2" charset="-78"/>
-              </a:rPr>
-              <a:t> </a:t>
-            </a:r>
-            <a:r>
-              <a:rPr lang="fa-IR" sz="3600" dirty="0" smtClean="0">
-                <a:cs typeface="B Nazanin" panose="00000400000000000000" pitchFamily="2" charset="-78"/>
-              </a:rPr>
-              <a:t>طراحی پردازنده کامل به همراه ضرب کننده تقریبی با خطای قابل کنترل با استفاده از زبان توصیف سخ</a:t>
+              <a:rPr lang="fa-IR" sz="3600" dirty="0" smtClean="0">
+                <a:cs typeface="B Nazanin" panose="00000400000000000000" pitchFamily="2" charset="-78"/>
+              </a:rPr>
+              <a:t>طراحی پردازنده کامل با </a:t>
+            </a:r>
+            <a:r>
+              <a:rPr lang="fa-IR" sz="3600" dirty="0" smtClean="0">
+                <a:cs typeface="B Nazanin" panose="00000400000000000000" pitchFamily="2" charset="-78"/>
+              </a:rPr>
+              <a:t>استفاده از زبان توصیف سخ</a:t>
             </a:r>
             <a:r>
               <a:rPr lang="fa-IR" sz="3600" dirty="0">
@@ -3014,16 +3089,16 @@
               <a:buChar char="•"/>
             </a:pPr>
             <a:r>
-              <a:rPr lang="fa-IR" sz="3600" dirty="0">
-                <a:cs typeface="B Nazanin" panose="00000400000000000000" pitchFamily="2" charset="-78"/>
-              </a:rPr>
-              <a:t> </a:t>
-            </a:r>
-            <a:r>
-              <a:rPr lang="fa-IR" sz="3600" dirty="0" smtClean="0">
-                <a:cs typeface="B Nazanin" panose="00000400000000000000" pitchFamily="2" charset="-78"/>
-              </a:rPr>
-              <a:t>تست و شبیه سازی پردازنده با اجرای برنامه های مختلف به زبان اسمبلی</a:t>
+              <a:rPr lang="fa-IR" sz="3600" dirty="0" smtClean="0">
+                <a:cs typeface="B Nazanin" panose="00000400000000000000" pitchFamily="2" charset="-78"/>
+              </a:rPr>
+              <a:t>تست </a:t>
+            </a:r>
+            <a:r>
+              <a:rPr lang="fa-IR" sz="3600" dirty="0" smtClean="0">
+                <a:cs typeface="B Nazanin" panose="00000400000000000000" pitchFamily="2" charset="-78"/>
+              </a:rPr>
+              <a:t>و شبیه سازی پردازنده با اجرای برنامه های مختلف به زبان اسمبلی</a:t>
             </a:r>
           </a:p>
           <a:p>
@@ -3035,16 +3110,16 @@
               <a:buChar char="•"/>
             </a:pPr>
             <a:r>
-              <a:rPr lang="fa-IR" sz="3600" dirty="0">
-                <a:cs typeface="B Nazanin" panose="00000400000000000000" pitchFamily="2" charset="-78"/>
-              </a:rPr>
-              <a:t> </a:t>
-            </a:r>
-            <a:r>
-              <a:rPr lang="fa-IR" sz="3600" dirty="0" smtClean="0">
-                <a:cs typeface="B Nazanin" panose="00000400000000000000" pitchFamily="2" charset="-78"/>
-              </a:rPr>
-              <a:t>تطبیق پردازنده با کامپایلر استاندارد </a:t>
+              <a:rPr lang="fa-IR" sz="3600" dirty="0" smtClean="0">
+                <a:cs typeface="B Nazanin" panose="00000400000000000000" pitchFamily="2" charset="-78"/>
+              </a:rPr>
+              <a:t>تطبیق </a:t>
+            </a:r>
+            <a:r>
+              <a:rPr lang="fa-IR" sz="3600" dirty="0" smtClean="0">
+                <a:cs typeface="B Nazanin" panose="00000400000000000000" pitchFamily="2" charset="-78"/>
+              </a:rPr>
+              <a:t>پردازنده با کامپایلر استاندارد </a:t>
             </a:r>
             <a:r>
               <a:rPr lang="en-US" sz="3600" dirty="0" smtClean="0">
@@ -3080,7 +3155,13 @@
               <a:rPr lang="fa-IR" sz="3600" dirty="0" smtClean="0">
                 <a:cs typeface="B Nazanin" panose="00000400000000000000" pitchFamily="2" charset="-78"/>
               </a:rPr>
-              <a:t> طراحی و تولید یک نرم افزار کامل جهت اجرای برنامه کاربر به زبان </a:t>
+              <a:t>طراحی </a:t>
+            </a:r>
+            <a:r>
+              <a:rPr lang="fa-IR" sz="3600" dirty="0" smtClean="0">
+                <a:cs typeface="B Nazanin" panose="00000400000000000000" pitchFamily="2" charset="-78"/>
+              </a:rPr>
+              <a:t>و تولید یک نرم افزار کامل جهت اجرای برنامه کاربر به زبان </a:t>
             </a:r>
             <a:r>
               <a:rPr lang="en-US" sz="3600" dirty="0" smtClean="0">
@@ -3092,19 +3173,7 @@
               <a:rPr lang="fa-IR" sz="3600" dirty="0" smtClean="0">
                 <a:cs typeface="B Nazanin" panose="00000400000000000000" pitchFamily="2" charset="-78"/>
               </a:rPr>
-              <a:t> و اسمبلی روی پردازنده، منطبق با سیستم </a:t>
-            </a:r>
-            <a:r>
-              <a:rPr lang="fa-IR" sz="3600" dirty="0" smtClean="0">
-                <a:cs typeface="B Nazanin" panose="00000400000000000000" pitchFamily="2" charset="-78"/>
-              </a:rPr>
-              <a:t>عامل </a:t>
-            </a:r>
-            <a:r>
-              <a:rPr lang="fa-IR" sz="3600" dirty="0" smtClean="0">
-                <a:cs typeface="B Nazanin" panose="00000400000000000000" pitchFamily="2" charset="-78"/>
-              </a:rPr>
-              <a:t>های ویندوز و لینوکس</a:t>
+              <a:t> و اسمبلی روی پردازنده، منطبق با سیستم عامل های ویندوز و لینوکس</a:t>
             </a:r>
           </a:p>
           <a:p>
@@ -4297,7 +4366,7 @@
         </p:nvGrpSpPr>
         <p:grpSpPr>
           <a:xfrm>
-            <a:off x="14527869" y="3708626"/>
+            <a:off x="14527869" y="3756373"/>
             <a:ext cx="6126480" cy="731520"/>
             <a:chOff x="30117740" y="7058354"/>
             <a:chExt cx="10563480" cy="1021749"/>
@@ -4477,7 +4546,7 @@
         </p:nvGrpSpPr>
         <p:grpSpPr>
           <a:xfrm>
-            <a:off x="14535309" y="12772018"/>
+            <a:off x="14535309" y="14485565"/>
             <a:ext cx="6126480" cy="685800"/>
             <a:chOff x="30117740" y="7058350"/>
             <a:chExt cx="10563480" cy="1021753"/>
@@ -4657,7 +4726,7 @@
         </p:nvGrpSpPr>
         <p:grpSpPr>
           <a:xfrm>
-            <a:off x="14518898" y="20378781"/>
+            <a:off x="14518898" y="21254317"/>
             <a:ext cx="6126480" cy="731520"/>
             <a:chOff x="30117740" y="4178740"/>
             <a:chExt cx="10563480" cy="1021753"/>
@@ -4859,8 +4928,8 @@
         </p:nvSpPr>
         <p:spPr>
           <a:xfrm>
-            <a:off x="14527869" y="21470341"/>
-            <a:ext cx="6098005" cy="7726557"/>
+            <a:off x="14527869" y="22273484"/>
+            <a:ext cx="6098005" cy="6685689"/>
           </a:xfrm>
           <a:prstGeom prst="rect">
             <a:avLst/>
@@ -4889,8 +4958,17 @@
               <a:rPr lang="fa-IR" sz="3600" dirty="0" smtClean="0">
                 <a:cs typeface="B Nazanin" panose="00000400000000000000" pitchFamily="2" charset="-78"/>
               </a:rPr>
-              <a:t>طراحی پردازنده در سطح معماری و رسم بلوک دایگرام بعد از انجام مطالعات در زمینه معماری مورد نظر</a:t>
-            </a:r>
+              <a:t>طراحی پردازنده در سطح معماری و رسم بلوک دایگرام بعد از انجام مطالعات در زمینه معماری مورد </a:t>
+            </a:r>
+            <a:r>
+              <a:rPr lang="fa-IR" sz="3600" dirty="0" smtClean="0">
+                <a:cs typeface="B Nazanin" panose="00000400000000000000" pitchFamily="2" charset="-78"/>
+              </a:rPr>
+              <a:t>نظر</a:t>
+            </a:r>
+            <a:endParaRPr lang="fa-IR" sz="3600" dirty="0">
+              <a:cs typeface="B Nazanin" panose="00000400000000000000" pitchFamily="2" charset="-78"/>
+            </a:endParaRPr>
           </a:p>
           <a:p>
             <a:pPr algn="just" rtl="1">
@@ -4898,16 +4976,6 @@
                 <a:spcPct val="115000"/>
               </a:lnSpc>
             </a:pPr>
-            <a:endParaRPr lang="fa-IR" sz="3600" dirty="0">
-              <a:cs typeface="B Nazanin" panose="00000400000000000000" pitchFamily="2" charset="-78"/>
-            </a:endParaRPr>
-          </a:p>
-          <a:p>
-            <a:pPr algn="just" rtl="1">
-              <a:lnSpc>
-                <a:spcPct val="115000"/>
-              </a:lnSpc>
-            </a:pPr>
             <a:r>
               <a:rPr lang="fa-IR" sz="3600" dirty="0">
                 <a:cs typeface="B Nazanin" panose="00000400000000000000" pitchFamily="2" charset="-78"/>
@@ -4938,16 +5006,6 @@
               </a:rPr>
               <a:t>Verilog</a:t>
             </a:r>
-            <a:endParaRPr lang="fa-IR" sz="3600" dirty="0" smtClean="0">
-              <a:cs typeface="B Nazanin" panose="00000400000000000000" pitchFamily="2" charset="-78"/>
-            </a:endParaRPr>
-          </a:p>
-          <a:p>
-            <a:pPr algn="just" rtl="1">
-              <a:lnSpc>
-                <a:spcPct val="115000"/>
-              </a:lnSpc>
-            </a:pPr>
             <a:endParaRPr lang="fa-IR" sz="3600" dirty="0">
               <a:cs typeface="B Nazanin" panose="00000400000000000000" pitchFamily="2" charset="-78"/>
             </a:endParaRPr>
@@ -4996,7 +5054,7 @@
         </p:nvSpPr>
         <p:spPr bwMode="auto">
           <a:xfrm>
-            <a:off x="8371931" y="29049883"/>
+            <a:off x="8371931" y="28066287"/>
             <a:ext cx="4715251" cy="579683"/>
           </a:xfrm>
           <a:prstGeom prst="rect">
@@ -5168,8 +5226,8 @@
         </p:nvSpPr>
         <p:spPr>
           <a:xfrm>
-            <a:off x="14644147" y="4802348"/>
-            <a:ext cx="5981727" cy="7522977"/>
+            <a:off x="14644147" y="4836494"/>
+            <a:ext cx="5981727" cy="9433047"/>
           </a:xfrm>
           <a:prstGeom prst="rect">
             <a:avLst/>
@@ -5191,7 +5249,13 @@
               <a:rPr lang="fa-IR" sz="3600" dirty="0" smtClean="0">
                 <a:cs typeface="B Nazanin" panose="00000400000000000000" pitchFamily="2" charset="-78"/>
               </a:rPr>
-              <a:t> طراحی یک پردازنده 32 بیتی تحت معماری </a:t>
+              <a:t>طراحی </a:t>
+            </a:r>
+            <a:r>
+              <a:rPr lang="fa-IR" sz="3600" dirty="0" smtClean="0">
+                <a:cs typeface="B Nazanin" panose="00000400000000000000" pitchFamily="2" charset="-78"/>
+              </a:rPr>
+              <a:t>یک پردازنده 32 بیتی تحت معماری </a:t>
             </a:r>
             <a:r>
               <a:rPr lang="en-US" sz="3600" dirty="0" smtClean="0">
@@ -5221,14 +5285,14 @@
               <a:rPr lang="fa-IR" sz="3600" dirty="0" smtClean="0">
                 <a:cs typeface="B Nazanin" panose="00000400000000000000" pitchFamily="2" charset="-78"/>
               </a:rPr>
-              <a:t>و اسمبلی.</a:t>
-            </a:r>
-          </a:p>
-          <a:p>
-            <a:pPr algn="just" rtl="1"/>
-            <a:endParaRPr lang="fa-IR" sz="3600" dirty="0" smtClean="0">
-              <a:cs typeface="B Nazanin" panose="00000400000000000000" pitchFamily="2" charset="-78"/>
-            </a:endParaRPr>
+              <a:t>و </a:t>
+            </a:r>
+            <a:r>
+              <a:rPr lang="fa-IR" sz="3600" dirty="0" smtClean="0">
+                <a:cs typeface="B Nazanin" panose="00000400000000000000" pitchFamily="2" charset="-78"/>
+              </a:rPr>
+              <a:t>اسمبلی</a:t>
+            </a:r>
           </a:p>
           <a:p>
             <a:pPr marL="261908" indent="-261908" algn="just" rtl="1">
@@ -5236,16 +5300,10 @@
               <a:buChar char="•"/>
             </a:pPr>
             <a:r>
-              <a:rPr lang="fa-IR" sz="3600" dirty="0">
-                <a:cs typeface="B Nazanin" panose="00000400000000000000" pitchFamily="2" charset="-78"/>
-              </a:rPr>
-              <a:t> </a:t>
-            </a:r>
-            <a:r>
-              <a:rPr lang="fa-IR" sz="3600" dirty="0" smtClean="0">
-                <a:cs typeface="B Nazanin" panose="00000400000000000000" pitchFamily="2" charset="-78"/>
-              </a:rPr>
-              <a:t>ویژگی ها: پردازنده دارای عملگر ضرب‌کننده تقریبی با خطای قابل تنظیم برای عملیات های پردازش تصویر و هوش مصنوعی</a:t>
+              <a:rPr lang="fa-IR" sz="3600" dirty="0" smtClean="0">
+                <a:cs typeface="B Nazanin" panose="00000400000000000000" pitchFamily="2" charset="-78"/>
+              </a:rPr>
+              <a:t>طراحی یک ضرب کننده تقریبی برای مصارف پردازش تصویر</a:t>
             </a:r>
           </a:p>
           <a:p>
@@ -5253,7 +5311,7 @@
               <a:buFont typeface="Arial" panose="020B0604020202020204" pitchFamily="34" charset="0"/>
               <a:buChar char="•"/>
             </a:pPr>
-            <a:endParaRPr lang="fa-IR" sz="3600" dirty="0">
+            <a:endParaRPr lang="fa-IR" sz="3600" dirty="0" smtClean="0">
               <a:cs typeface="B Nazanin" panose="00000400000000000000" pitchFamily="2" charset="-78"/>
             </a:endParaRPr>
           </a:p>
@@ -5266,7 +5324,76 @@
               <a:rPr lang="fa-IR" sz="3600" dirty="0" smtClean="0">
                 <a:cs typeface="B Nazanin" panose="00000400000000000000" pitchFamily="2" charset="-78"/>
               </a:rPr>
-              <a:t> فرکانس کاری 250 مگاهرتز و قابل مقایسه با پردازنده های معروف و صنعتی </a:t>
+              <a:t>ویژگی </a:t>
+            </a:r>
+            <a:r>
+              <a:rPr lang="fa-IR" sz="3600" dirty="0" smtClean="0">
+                <a:cs typeface="B Nazanin" panose="00000400000000000000" pitchFamily="2" charset="-78"/>
+              </a:rPr>
+              <a:t>ها</a:t>
+            </a:r>
+            <a:r>
+              <a:rPr lang="fa-IR" sz="3600" dirty="0" smtClean="0">
+                <a:cs typeface="B Nazanin" panose="00000400000000000000" pitchFamily="2" charset="-78"/>
+              </a:rPr>
+              <a:t>:</a:t>
+            </a:r>
+          </a:p>
+          <a:p>
+            <a:pPr marL="261908" indent="-261908" algn="just" rtl="1">
+              <a:buFont typeface="Arial" panose="020B0604020202020204" pitchFamily="34" charset="0"/>
+              <a:buChar char="•"/>
+            </a:pPr>
+            <a:r>
+              <a:rPr lang="fa-IR" sz="3600" dirty="0" smtClean="0">
+                <a:cs typeface="B Nazanin" panose="00000400000000000000" pitchFamily="2" charset="-78"/>
+              </a:rPr>
+              <a:t>ضرب‌کننده </a:t>
+            </a:r>
+            <a:r>
+              <a:rPr lang="fa-IR" sz="3600" dirty="0" smtClean="0">
+                <a:cs typeface="B Nazanin" panose="00000400000000000000" pitchFamily="2" charset="-78"/>
+              </a:rPr>
+              <a:t>تقریبی با خطای قابل تنظیم برای عملیات های پردازش تصویر و هوش </a:t>
+            </a:r>
+            <a:r>
+              <a:rPr lang="fa-IR" sz="3600" dirty="0" smtClean="0">
+                <a:cs typeface="B Nazanin" panose="00000400000000000000" pitchFamily="2" charset="-78"/>
+              </a:rPr>
+              <a:t>مصنوعی</a:t>
+            </a:r>
+          </a:p>
+          <a:p>
+            <a:pPr marL="261908" indent="-261908" algn="just" rtl="1">
+              <a:buFont typeface="Arial" panose="020B0604020202020204" pitchFamily="34" charset="0"/>
+              <a:buChar char="•"/>
+            </a:pPr>
+            <a:r>
+              <a:rPr lang="fa-IR" sz="3600" dirty="0" smtClean="0">
+                <a:cs typeface="B Nazanin" panose="00000400000000000000" pitchFamily="2" charset="-78"/>
+              </a:rPr>
+              <a:t>پردازنده پایپلاین با واحد کنترل غیر متمرکز و طراحی قبال گسترش و ماژولار</a:t>
+            </a:r>
+            <a:endParaRPr lang="fa-IR" sz="3600" dirty="0">
+              <a:cs typeface="B Nazanin" panose="00000400000000000000" pitchFamily="2" charset="-78"/>
+            </a:endParaRPr>
+          </a:p>
+          <a:p>
+            <a:pPr marL="261908" indent="-261908" algn="just" rtl="1">
+              <a:buFont typeface="Arial" panose="020B0604020202020204" pitchFamily="34" charset="0"/>
+              <a:buChar char="•"/>
+            </a:pPr>
+            <a:r>
+              <a:rPr lang="fa-IR" sz="3600" dirty="0" smtClean="0">
+                <a:cs typeface="B Nazanin" panose="00000400000000000000" pitchFamily="2" charset="-78"/>
+              </a:rPr>
+              <a:t>فرکانس </a:t>
+            </a:r>
+            <a:r>
+              <a:rPr lang="fa-IR" sz="3600" dirty="0" smtClean="0">
+                <a:cs typeface="B Nazanin" panose="00000400000000000000" pitchFamily="2" charset="-78"/>
+              </a:rPr>
+              <a:t>کاری 250 مگاهرتز و قابل مقایسه با پردازنده های معروف و صنعتی </a:t>
             </a:r>
             <a:r>
               <a:rPr lang="en-US" sz="3600" dirty="0" smtClean="0">
@@ -5330,8 +5457,8 @@
         </p:nvSpPr>
         <p:spPr>
           <a:xfrm>
-            <a:off x="14529318" y="13696896"/>
-            <a:ext cx="6126479" cy="7197381"/>
+            <a:off x="14529318" y="15277653"/>
+            <a:ext cx="6126479" cy="5637007"/>
           </a:xfrm>
           <a:prstGeom prst="rect">
             <a:avLst/>
@@ -5371,26 +5498,19 @@
               <a:rPr lang="fa-IR" sz="3600" dirty="0" smtClean="0">
                 <a:cs typeface="B Nazanin" panose="00000400000000000000" pitchFamily="2" charset="-78"/>
               </a:rPr>
-              <a:t> </a:t>
+              <a:t>آزمایشگاه </a:t>
             </a:r>
             <a:r>
               <a:rPr lang="fa-IR" sz="3600" dirty="0">
                 <a:cs typeface="B Nazanin" panose="00000400000000000000" pitchFamily="2" charset="-78"/>
               </a:rPr>
-              <a:t>آزمایشگاه طراحی مدار مجتمع دیجیتال</a:t>
-            </a:r>
-          </a:p>
-          <a:p>
-            <a:pPr algn="just" rtl="1">
-              <a:lnSpc>
-                <a:spcPct val="114000"/>
-              </a:lnSpc>
-            </a:pPr>
-            <a:r>
-              <a:rPr lang="fa-IR" sz="3600" dirty="0" smtClean="0">
-                <a:cs typeface="B Nazanin" panose="00000400000000000000" pitchFamily="2" charset="-78"/>
-              </a:rPr>
-              <a:t> </a:t>
+              <a:t>طراحی مدار مجتمع </a:t>
+            </a:r>
+            <a:r>
+              <a:rPr lang="fa-IR" sz="3600" dirty="0" smtClean="0">
+                <a:cs typeface="B Nazanin" panose="00000400000000000000" pitchFamily="2" charset="-78"/>
+              </a:rPr>
+              <a:t>دیجیتال</a:t>
             </a:r>
             <a:endParaRPr lang="fa-IR" sz="3600" dirty="0">
               <a:cs typeface="B Nazanin" panose="00000400000000000000" pitchFamily="2" charset="-78"/>
@@ -5408,7 +5528,13 @@
               <a:rPr lang="fa-IR" sz="3600" dirty="0" smtClean="0">
                 <a:cs typeface="B Nazanin" panose="00000400000000000000" pitchFamily="2" charset="-78"/>
               </a:rPr>
-              <a:t> نوع فعالیت: طراحی، شبیه سازی و پیاده سازی مدار های مجتمع دیجیتال با استفاده از زبان های توصیف سخت افزار و برد های </a:t>
+              <a:t>نوع </a:t>
+            </a:r>
+            <a:r>
+              <a:rPr lang="fa-IR" sz="3600" dirty="0" smtClean="0">
+                <a:cs typeface="B Nazanin" panose="00000400000000000000" pitchFamily="2" charset="-78"/>
+              </a:rPr>
+              <a:t>فعالیت: طراحی، شبیه سازی و پیاده سازی مدار های مجتمع دیجیتال با استفاده از زبان های توصیف سخت افزار و برد های </a:t>
             </a:r>
             <a:r>
               <a:rPr lang="en-US" sz="3600" dirty="0" smtClean="0">
@@ -5449,8 +5575,38 @@
         </p:blipFill>
         <p:spPr>
           <a:xfrm>
-            <a:off x="8033866" y="24686185"/>
+            <a:off x="8033866" y="23702589"/>
             <a:ext cx="5244572" cy="4315277"/>
+          </a:xfrm>
+          <a:prstGeom prst="rect">
+            <a:avLst/>
+          </a:prstGeom>
+        </p:spPr>
+      </p:pic>
+      <p:pic>
+        <p:nvPicPr>
+          <p:cNvPr id="12" name="Picture 11"/>
+          <p:cNvPicPr>
+            <a:picLocks noChangeAspect="1"/>
+          </p:cNvPicPr>
+          <p:nvPr/>
+        </p:nvPicPr>
+        <p:blipFill>
+          <a:blip r:embed="rId6" cstate="print">
+            <a:extLst>
+              <a:ext uri="{28A0092B-C50C-407E-A947-70E740481C1C}">
+                <a14:useLocalDpi xmlns:a14="http://schemas.microsoft.com/office/drawing/2010/main" val="0"/>
+              </a:ext>
+            </a:extLst>
+          </a:blip>
+          <a:stretch>
+            <a:fillRect/>
+          </a:stretch>
+        </p:blipFill>
+        <p:spPr>
+          <a:xfrm>
+            <a:off x="2470268" y="15405218"/>
+            <a:ext cx="2624213" cy="1381165"/>
           </a:xfrm>
           <a:prstGeom prst="rect">
             <a:avLst/>

</xml_diff>

<commit_message>
📝 Add block diagram to poster
</commit_message>
<xml_diff>
--- a/Documents/Temporary_Documents/پوستر-کارآموزی.pptx
+++ b/Documents/Temporary_Documents/پوستر-کارآموزی.pptx
@@ -3014,7 +3014,19 @@
               <a:rPr lang="fa-IR" sz="3600" dirty="0" smtClean="0">
                 <a:cs typeface="B Nazanin" panose="00000400000000000000" pitchFamily="2" charset="-78"/>
               </a:rPr>
-              <a:t>ضرب کننده در الگوریتم پردازش تصویر و مقایسه نتیج با مقالات معتبر</a:t>
+              <a:t>ضرب کننده در الگوریتم پردازش تصویر و مقایسه </a:t>
+            </a:r>
+            <a:r>
+              <a:rPr lang="fa-IR" sz="3600" dirty="0" smtClean="0">
+                <a:cs typeface="B Nazanin" panose="00000400000000000000" pitchFamily="2" charset="-78"/>
+              </a:rPr>
+              <a:t>نتایج </a:t>
+            </a:r>
+            <a:r>
+              <a:rPr lang="fa-IR" sz="3600" dirty="0" smtClean="0">
+                <a:cs typeface="B Nazanin" panose="00000400000000000000" pitchFamily="2" charset="-78"/>
+              </a:rPr>
+              <a:t>با مقالات معتبر</a:t>
             </a:r>
           </a:p>
           <a:p>
@@ -3029,14 +3041,35 @@
               <a:rPr lang="fa-IR" sz="3600" dirty="0" smtClean="0">
                 <a:cs typeface="B Nazanin" panose="00000400000000000000" pitchFamily="2" charset="-78"/>
               </a:rPr>
-              <a:t>طراحی </a:t>
-            </a:r>
-            <a:r>
-              <a:rPr lang="fa-IR" sz="3600" dirty="0" smtClean="0">
-                <a:cs typeface="B Nazanin" panose="00000400000000000000" pitchFamily="2" charset="-78"/>
-              </a:rPr>
-              <a:t>و رسم بلوک دیاگرام پردازنده</a:t>
-            </a:r>
+              <a:t>طراحی پردازنده کامل با </a:t>
+            </a:r>
+            <a:r>
+              <a:rPr lang="fa-IR" sz="3600" dirty="0" smtClean="0">
+                <a:cs typeface="B Nazanin" panose="00000400000000000000" pitchFamily="2" charset="-78"/>
+              </a:rPr>
+              <a:t>استفاده از زبان توصیف سخ</a:t>
+            </a:r>
+            <a:r>
+              <a:rPr lang="fa-IR" sz="3600" dirty="0">
+                <a:cs typeface="B Nazanin" panose="00000400000000000000" pitchFamily="2" charset="-78"/>
+              </a:rPr>
+              <a:t>ت</a:t>
+            </a:r>
+            <a:r>
+              <a:rPr lang="fa-IR" sz="3600" dirty="0" smtClean="0">
+                <a:cs typeface="B Nazanin" panose="00000400000000000000" pitchFamily="2" charset="-78"/>
+              </a:rPr>
+              <a:t> فزار </a:t>
+            </a:r>
+            <a:r>
+              <a:rPr lang="en-US" sz="3600" dirty="0" smtClean="0">
+                <a:cs typeface="B Nazanin" panose="00000400000000000000" pitchFamily="2" charset="-78"/>
+              </a:rPr>
+              <a:t>Verilog</a:t>
+            </a:r>
+            <a:endParaRPr lang="fa-IR" sz="3600" dirty="0" smtClean="0">
+              <a:cs typeface="B Nazanin" panose="00000400000000000000" pitchFamily="2" charset="-78"/>
+            </a:endParaRPr>
           </a:p>
           <a:p>
             <a:pPr marL="228609" indent="-228609" algn="just" rtl="1">
@@ -3050,31 +3083,31 @@
               <a:rPr lang="fa-IR" sz="3600" dirty="0" smtClean="0">
                 <a:cs typeface="B Nazanin" panose="00000400000000000000" pitchFamily="2" charset="-78"/>
               </a:rPr>
-              <a:t>طراحی پردازنده کامل با </a:t>
-            </a:r>
-            <a:r>
-              <a:rPr lang="fa-IR" sz="3600" dirty="0" smtClean="0">
-                <a:cs typeface="B Nazanin" panose="00000400000000000000" pitchFamily="2" charset="-78"/>
-              </a:rPr>
-              <a:t>استفاده از زبان توصیف سخ</a:t>
-            </a:r>
-            <a:r>
-              <a:rPr lang="fa-IR" sz="3600" dirty="0">
-                <a:cs typeface="B Nazanin" panose="00000400000000000000" pitchFamily="2" charset="-78"/>
-              </a:rPr>
-              <a:t>ت</a:t>
-            </a:r>
-            <a:r>
-              <a:rPr lang="fa-IR" sz="3600" dirty="0" smtClean="0">
-                <a:cs typeface="B Nazanin" panose="00000400000000000000" pitchFamily="2" charset="-78"/>
-              </a:rPr>
-              <a:t> فزار </a:t>
+              <a:t>تطبیق </a:t>
+            </a:r>
+            <a:r>
+              <a:rPr lang="fa-IR" sz="3600" dirty="0" smtClean="0">
+                <a:cs typeface="B Nazanin" panose="00000400000000000000" pitchFamily="2" charset="-78"/>
+              </a:rPr>
+              <a:t>پردازنده با کامپایلر استاندارد </a:t>
             </a:r>
             <a:r>
               <a:rPr lang="en-US" sz="3600" dirty="0" smtClean="0">
                 <a:cs typeface="B Nazanin" panose="00000400000000000000" pitchFamily="2" charset="-78"/>
               </a:rPr>
-              <a:t>Verilog</a:t>
+              <a:t>GCC</a:t>
+            </a:r>
+            <a:r>
+              <a:rPr lang="fa-IR" sz="3600" dirty="0" smtClean="0">
+                <a:cs typeface="B Nazanin" panose="00000400000000000000" pitchFamily="2" charset="-78"/>
+              </a:rPr>
+              <a:t> برای اجرای برنامه به زبان </a:t>
+            </a:r>
+            <a:r>
+              <a:rPr lang="en-US" sz="3600" dirty="0" smtClean="0">
+                <a:cs typeface="B Nazanin" panose="00000400000000000000" pitchFamily="2" charset="-78"/>
+              </a:rPr>
+              <a:t>C</a:t>
             </a:r>
             <a:endParaRPr lang="fa-IR" sz="3600" dirty="0" smtClean="0">
               <a:cs typeface="B Nazanin" panose="00000400000000000000" pitchFamily="2" charset="-78"/>
@@ -3092,13 +3125,19 @@
               <a:rPr lang="fa-IR" sz="3600" dirty="0" smtClean="0">
                 <a:cs typeface="B Nazanin" panose="00000400000000000000" pitchFamily="2" charset="-78"/>
               </a:rPr>
-              <a:t>تست </a:t>
-            </a:r>
-            <a:r>
-              <a:rPr lang="fa-IR" sz="3600" dirty="0" smtClean="0">
-                <a:cs typeface="B Nazanin" panose="00000400000000000000" pitchFamily="2" charset="-78"/>
-              </a:rPr>
-              <a:t>و شبیه سازی پردازنده با اجرای برنامه های مختلف به زبان اسمبلی</a:t>
+              <a:t>طراحی و تولید یک نرم افزار کامل جهت اجرای برنامه کاربر به زبان </a:t>
+            </a:r>
+            <a:r>
+              <a:rPr lang="en-US" sz="3600" dirty="0" smtClean="0">
+                <a:cs typeface="B Nazanin" panose="00000400000000000000" pitchFamily="2" charset="-78"/>
+              </a:rPr>
+              <a:t>C</a:t>
+            </a:r>
+            <a:r>
+              <a:rPr lang="fa-IR" sz="3600" dirty="0" smtClean="0">
+                <a:cs typeface="B Nazanin" panose="00000400000000000000" pitchFamily="2" charset="-78"/>
+              </a:rPr>
+              <a:t> و اسمبلی روی پردازنده، منطبق با سیستم عامل های ویندوز و لینوکس</a:t>
             </a:r>
           </a:p>
           <a:p>
@@ -3111,81 +3150,6 @@
             </a:pPr>
             <a:r>
               <a:rPr lang="fa-IR" sz="3600" dirty="0" smtClean="0">
-                <a:cs typeface="B Nazanin" panose="00000400000000000000" pitchFamily="2" charset="-78"/>
-              </a:rPr>
-              <a:t>تطبیق </a:t>
-            </a:r>
-            <a:r>
-              <a:rPr lang="fa-IR" sz="3600" dirty="0" smtClean="0">
-                <a:cs typeface="B Nazanin" panose="00000400000000000000" pitchFamily="2" charset="-78"/>
-              </a:rPr>
-              <a:t>پردازنده با کامپایلر استاندارد </a:t>
-            </a:r>
-            <a:r>
-              <a:rPr lang="en-US" sz="3600" dirty="0" smtClean="0">
-                <a:cs typeface="B Nazanin" panose="00000400000000000000" pitchFamily="2" charset="-78"/>
-              </a:rPr>
-              <a:t>GCC</a:t>
-            </a:r>
-            <a:r>
-              <a:rPr lang="fa-IR" sz="3600" dirty="0" smtClean="0">
-                <a:cs typeface="B Nazanin" panose="00000400000000000000" pitchFamily="2" charset="-78"/>
-              </a:rPr>
-              <a:t> برای اجرای برنامه به زبان </a:t>
-            </a:r>
-            <a:r>
-              <a:rPr lang="en-US" sz="3600" dirty="0" smtClean="0">
-                <a:cs typeface="B Nazanin" panose="00000400000000000000" pitchFamily="2" charset="-78"/>
-              </a:rPr>
-              <a:t>C</a:t>
-            </a:r>
-            <a:endParaRPr lang="fa-IR" sz="3600" dirty="0">
-              <a:cs typeface="B Nazanin" panose="00000400000000000000" pitchFamily="2" charset="-78"/>
-            </a:endParaRPr>
-          </a:p>
-          <a:p>
-            <a:pPr marL="228609" indent="-228609" algn="just" rtl="1">
-              <a:lnSpc>
-                <a:spcPct val="114000"/>
-              </a:lnSpc>
-              <a:buFont typeface="Arial" panose="020B0604020202020204" pitchFamily="34" charset="0"/>
-              <a:buChar char="•"/>
-            </a:pPr>
-            <a:r>
-              <a:rPr lang="fa-IR" sz="3600" dirty="0" smtClean="0">
-                <a:cs typeface="B Nazanin" panose="00000400000000000000" pitchFamily="2" charset="-78"/>
-              </a:rPr>
-              <a:t>طراحی </a:t>
-            </a:r>
-            <a:r>
-              <a:rPr lang="fa-IR" sz="3600" dirty="0" smtClean="0">
-                <a:cs typeface="B Nazanin" panose="00000400000000000000" pitchFamily="2" charset="-78"/>
-              </a:rPr>
-              <a:t>و تولید یک نرم افزار کامل جهت اجرای برنامه کاربر به زبان </a:t>
-            </a:r>
-            <a:r>
-              <a:rPr lang="en-US" sz="3600" dirty="0" smtClean="0">
-                <a:cs typeface="B Nazanin" panose="00000400000000000000" pitchFamily="2" charset="-78"/>
-              </a:rPr>
-              <a:t>C</a:t>
-            </a:r>
-            <a:r>
-              <a:rPr lang="fa-IR" sz="3600" dirty="0" smtClean="0">
-                <a:cs typeface="B Nazanin" panose="00000400000000000000" pitchFamily="2" charset="-78"/>
-              </a:rPr>
-              <a:t> و اسمبلی روی پردازنده، منطبق با سیستم عامل های ویندوز و لینوکس</a:t>
-            </a:r>
-          </a:p>
-          <a:p>
-            <a:pPr marL="228609" indent="-228609" algn="just" rtl="1">
-              <a:lnSpc>
-                <a:spcPct val="114000"/>
-              </a:lnSpc>
-              <a:buFont typeface="Arial" panose="020B0604020202020204" pitchFamily="34" charset="0"/>
-              <a:buChar char="•"/>
-            </a:pPr>
-            <a:r>
-              <a:rPr lang="fa-IR" sz="3600" dirty="0">
                 <a:cs typeface="B Nazanin" panose="00000400000000000000" pitchFamily="2" charset="-78"/>
               </a:rPr>
               <a:t> </a:t>
@@ -5605,8 +5569,8 @@
         </p:blipFill>
         <p:spPr>
           <a:xfrm>
-            <a:off x="2470268" y="15405218"/>
-            <a:ext cx="2624213" cy="1381165"/>
+            <a:off x="609583" y="13524187"/>
+            <a:ext cx="6395793" cy="3366207"/>
           </a:xfrm>
           <a:prstGeom prst="rect">
             <a:avLst/>

</xml_diff>